<commit_message>
replace exlosion star to circle
</commit_message>
<xml_diff>
--- a/docs/Drone War.pptx
+++ b/docs/Drone War.pptx
@@ -206,7 +206,7 @@
           <a:p>
             <a:fld id="{2AB96B5A-31E3-C345-B287-13FA72BD00D5}" type="datetimeFigureOut">
               <a:rPr kumimoji="1" lang="zh-CN" altLang="en-US" smtClean="0"/>
-              <a:t>12/15/12</a:t>
+              <a:t>12/18/12</a:t>
             </a:fld>
             <a:endParaRPr kumimoji="1" lang="zh-CN" altLang="en-US"/>
           </a:p>
@@ -739,7 +739,7 @@
           <a:p>
             <a:fld id="{0B9542A4-DC4B-004C-B3C0-DE19A52D67B3}" type="datetimeFigureOut">
               <a:rPr kumimoji="1" lang="zh-CN" altLang="en-US" smtClean="0"/>
-              <a:t>12/15/12</a:t>
+              <a:t>12/18/12</a:t>
             </a:fld>
             <a:endParaRPr kumimoji="1" lang="zh-CN" altLang="en-US"/>
           </a:p>
@@ -909,7 +909,7 @@
           <a:p>
             <a:fld id="{0B9542A4-DC4B-004C-B3C0-DE19A52D67B3}" type="datetimeFigureOut">
               <a:rPr kumimoji="1" lang="zh-CN" altLang="en-US" smtClean="0"/>
-              <a:t>12/15/12</a:t>
+              <a:t>12/18/12</a:t>
             </a:fld>
             <a:endParaRPr kumimoji="1" lang="zh-CN" altLang="en-US"/>
           </a:p>
@@ -1089,7 +1089,7 @@
           <a:p>
             <a:fld id="{0B9542A4-DC4B-004C-B3C0-DE19A52D67B3}" type="datetimeFigureOut">
               <a:rPr kumimoji="1" lang="zh-CN" altLang="en-US" smtClean="0"/>
-              <a:t>12/15/12</a:t>
+              <a:t>12/18/12</a:t>
             </a:fld>
             <a:endParaRPr kumimoji="1" lang="zh-CN" altLang="en-US"/>
           </a:p>
@@ -1259,7 +1259,7 @@
           <a:p>
             <a:fld id="{0B9542A4-DC4B-004C-B3C0-DE19A52D67B3}" type="datetimeFigureOut">
               <a:rPr kumimoji="1" lang="zh-CN" altLang="en-US" smtClean="0"/>
-              <a:t>12/15/12</a:t>
+              <a:t>12/18/12</a:t>
             </a:fld>
             <a:endParaRPr kumimoji="1" lang="zh-CN" altLang="en-US"/>
           </a:p>
@@ -1505,7 +1505,7 @@
           <a:p>
             <a:fld id="{0B9542A4-DC4B-004C-B3C0-DE19A52D67B3}" type="datetimeFigureOut">
               <a:rPr kumimoji="1" lang="zh-CN" altLang="en-US" smtClean="0"/>
-              <a:t>12/15/12</a:t>
+              <a:t>12/18/12</a:t>
             </a:fld>
             <a:endParaRPr kumimoji="1" lang="zh-CN" altLang="en-US"/>
           </a:p>
@@ -1793,7 +1793,7 @@
           <a:p>
             <a:fld id="{0B9542A4-DC4B-004C-B3C0-DE19A52D67B3}" type="datetimeFigureOut">
               <a:rPr kumimoji="1" lang="zh-CN" altLang="en-US" smtClean="0"/>
-              <a:t>12/15/12</a:t>
+              <a:t>12/18/12</a:t>
             </a:fld>
             <a:endParaRPr kumimoji="1" lang="zh-CN" altLang="en-US"/>
           </a:p>
@@ -2215,7 +2215,7 @@
           <a:p>
             <a:fld id="{0B9542A4-DC4B-004C-B3C0-DE19A52D67B3}" type="datetimeFigureOut">
               <a:rPr kumimoji="1" lang="zh-CN" altLang="en-US" smtClean="0"/>
-              <a:t>12/15/12</a:t>
+              <a:t>12/18/12</a:t>
             </a:fld>
             <a:endParaRPr kumimoji="1" lang="zh-CN" altLang="en-US"/>
           </a:p>
@@ -2333,7 +2333,7 @@
           <a:p>
             <a:fld id="{0B9542A4-DC4B-004C-B3C0-DE19A52D67B3}" type="datetimeFigureOut">
               <a:rPr kumimoji="1" lang="zh-CN" altLang="en-US" smtClean="0"/>
-              <a:t>12/15/12</a:t>
+              <a:t>12/18/12</a:t>
             </a:fld>
             <a:endParaRPr kumimoji="1" lang="zh-CN" altLang="en-US"/>
           </a:p>
@@ -2428,7 +2428,7 @@
           <a:p>
             <a:fld id="{0B9542A4-DC4B-004C-B3C0-DE19A52D67B3}" type="datetimeFigureOut">
               <a:rPr kumimoji="1" lang="zh-CN" altLang="en-US" smtClean="0"/>
-              <a:t>12/15/12</a:t>
+              <a:t>12/18/12</a:t>
             </a:fld>
             <a:endParaRPr kumimoji="1" lang="zh-CN" altLang="en-US"/>
           </a:p>
@@ -2705,7 +2705,7 @@
           <a:p>
             <a:fld id="{0B9542A4-DC4B-004C-B3C0-DE19A52D67B3}" type="datetimeFigureOut">
               <a:rPr kumimoji="1" lang="zh-CN" altLang="en-US" smtClean="0"/>
-              <a:t>12/15/12</a:t>
+              <a:t>12/18/12</a:t>
             </a:fld>
             <a:endParaRPr kumimoji="1" lang="zh-CN" altLang="en-US"/>
           </a:p>
@@ -2958,7 +2958,7 @@
           <a:p>
             <a:fld id="{0B9542A4-DC4B-004C-B3C0-DE19A52D67B3}" type="datetimeFigureOut">
               <a:rPr kumimoji="1" lang="zh-CN" altLang="en-US" smtClean="0"/>
-              <a:t>12/15/12</a:t>
+              <a:t>12/18/12</a:t>
             </a:fld>
             <a:endParaRPr kumimoji="1" lang="zh-CN" altLang="en-US"/>
           </a:p>
@@ -3171,7 +3171,7 @@
           <a:p>
             <a:fld id="{0B9542A4-DC4B-004C-B3C0-DE19A52D67B3}" type="datetimeFigureOut">
               <a:rPr kumimoji="1" lang="zh-CN" altLang="en-US" smtClean="0"/>
-              <a:t>12/15/12</a:t>
+              <a:t>12/18/12</a:t>
             </a:fld>
             <a:endParaRPr kumimoji="1" lang="zh-CN" altLang="en-US"/>
           </a:p>

</xml_diff>